<commit_message>
Added Tom Habing's Presentations
</commit_message>
<xml_diff>
--- a/2015Workshop/BreakoutSessions.pptx
+++ b/2015Workshop/BreakoutSessions.pptx
@@ -2,7 +2,7 @@
 <file path=ppt/presentation.xml><?xml version="1.0" encoding="utf-8"?>
 <p:presentation xmlns:a="http://schemas.openxmlformats.org/drawingml/2006/main" xmlns:r="http://schemas.openxmlformats.org/officeDocument/2006/relationships" xmlns:p="http://schemas.openxmlformats.org/presentationml/2006/main" saveSubsetFonts="1">
   <p:sldMasterIdLst>
-    <p:sldMasterId id="2147483648" r:id="rId1"/>
+    <p:sldMasterId id="2147483660" r:id="rId1"/>
   </p:sldMasterIdLst>
   <p:sldIdLst>
     <p:sldId id="256" r:id="rId2"/>
@@ -105,6 +105,11 @@
       </a:defRPr>
     </a:lvl9pPr>
   </p:defaultTextStyle>
+  <p:extLst>
+    <p:ext uri="{EFAFB233-063F-42B5-8137-9DF3F51BA10A}">
+      <p15:sldGuideLst xmlns:p15="http://schemas.microsoft.com/office/powerpoint/2012/main"/>
+    </p:ext>
+  </p:extLst>
 </p:presentation>
 </file>
 
@@ -237,9 +242,9 @@
           <a:bodyPr/>
           <a:lstStyle/>
           <a:p>
-            <a:fld id="{66B4ACDD-7230-4CA3-81A9-E784334FCE84}" type="datetimeFigureOut">
-              <a:rPr lang="en-US" smtClean="0"/>
-              <a:t>10/26/2015</a:t>
+            <a:fld id="{1F0E5C3F-7028-4B55-89E7-A5F6B3B3A01B}" type="datetimeFigureOut">
+              <a:rPr lang="en-US" smtClean="0"/>
+              <a:t>11/1/2015</a:t>
             </a:fld>
             <a:endParaRPr lang="en-US"/>
           </a:p>
@@ -279,7 +284,7 @@
           <a:bodyPr/>
           <a:lstStyle/>
           <a:p>
-            <a:fld id="{5B82BE30-0701-4B33-9FB7-97809ADFA210}" type="slidenum">
+            <a:fld id="{1E7AE30F-572E-4FBC-BA8C-F5F3D0B8DDE7}" type="slidenum">
               <a:rPr lang="en-US" smtClean="0"/>
               <a:t>‹#›</a:t>
             </a:fld>
@@ -290,7 +295,7 @@
     </p:spTree>
     <p:extLst>
       <p:ext uri="{BB962C8B-B14F-4D97-AF65-F5344CB8AC3E}">
-        <p14:creationId xmlns:p14="http://schemas.microsoft.com/office/powerpoint/2010/main" val="2250270402"/>
+        <p14:creationId xmlns:p14="http://schemas.microsoft.com/office/powerpoint/2010/main" val="3418741190"/>
       </p:ext>
     </p:extLst>
   </p:cSld>
@@ -407,9 +412,9 @@
           <a:bodyPr/>
           <a:lstStyle/>
           <a:p>
-            <a:fld id="{66B4ACDD-7230-4CA3-81A9-E784334FCE84}" type="datetimeFigureOut">
-              <a:rPr lang="en-US" smtClean="0"/>
-              <a:t>10/26/2015</a:t>
+            <a:fld id="{1F0E5C3F-7028-4B55-89E7-A5F6B3B3A01B}" type="datetimeFigureOut">
+              <a:rPr lang="en-US" smtClean="0"/>
+              <a:t>11/1/2015</a:t>
             </a:fld>
             <a:endParaRPr lang="en-US"/>
           </a:p>
@@ -449,7 +454,7 @@
           <a:bodyPr/>
           <a:lstStyle/>
           <a:p>
-            <a:fld id="{5B82BE30-0701-4B33-9FB7-97809ADFA210}" type="slidenum">
+            <a:fld id="{1E7AE30F-572E-4FBC-BA8C-F5F3D0B8DDE7}" type="slidenum">
               <a:rPr lang="en-US" smtClean="0"/>
               <a:t>‹#›</a:t>
             </a:fld>
@@ -460,7 +465,7 @@
     </p:spTree>
     <p:extLst>
       <p:ext uri="{BB962C8B-B14F-4D97-AF65-F5344CB8AC3E}">
-        <p14:creationId xmlns:p14="http://schemas.microsoft.com/office/powerpoint/2010/main" val="2092962901"/>
+        <p14:creationId xmlns:p14="http://schemas.microsoft.com/office/powerpoint/2010/main" val="2444334503"/>
       </p:ext>
     </p:extLst>
   </p:cSld>
@@ -587,9 +592,9 @@
           <a:bodyPr/>
           <a:lstStyle/>
           <a:p>
-            <a:fld id="{66B4ACDD-7230-4CA3-81A9-E784334FCE84}" type="datetimeFigureOut">
-              <a:rPr lang="en-US" smtClean="0"/>
-              <a:t>10/26/2015</a:t>
+            <a:fld id="{1F0E5C3F-7028-4B55-89E7-A5F6B3B3A01B}" type="datetimeFigureOut">
+              <a:rPr lang="en-US" smtClean="0"/>
+              <a:t>11/1/2015</a:t>
             </a:fld>
             <a:endParaRPr lang="en-US"/>
           </a:p>
@@ -629,7 +634,7 @@
           <a:bodyPr/>
           <a:lstStyle/>
           <a:p>
-            <a:fld id="{5B82BE30-0701-4B33-9FB7-97809ADFA210}" type="slidenum">
+            <a:fld id="{1E7AE30F-572E-4FBC-BA8C-F5F3D0B8DDE7}" type="slidenum">
               <a:rPr lang="en-US" smtClean="0"/>
               <a:t>‹#›</a:t>
             </a:fld>
@@ -640,7 +645,7 @@
     </p:spTree>
     <p:extLst>
       <p:ext uri="{BB962C8B-B14F-4D97-AF65-F5344CB8AC3E}">
-        <p14:creationId xmlns:p14="http://schemas.microsoft.com/office/powerpoint/2010/main" val="3656179901"/>
+        <p14:creationId xmlns:p14="http://schemas.microsoft.com/office/powerpoint/2010/main" val="3002513214"/>
       </p:ext>
     </p:extLst>
   </p:cSld>
@@ -757,9 +762,9 @@
           <a:bodyPr/>
           <a:lstStyle/>
           <a:p>
-            <a:fld id="{66B4ACDD-7230-4CA3-81A9-E784334FCE84}" type="datetimeFigureOut">
-              <a:rPr lang="en-US" smtClean="0"/>
-              <a:t>10/26/2015</a:t>
+            <a:fld id="{1F0E5C3F-7028-4B55-89E7-A5F6B3B3A01B}" type="datetimeFigureOut">
+              <a:rPr lang="en-US" smtClean="0"/>
+              <a:t>11/1/2015</a:t>
             </a:fld>
             <a:endParaRPr lang="en-US"/>
           </a:p>
@@ -799,7 +804,7 @@
           <a:bodyPr/>
           <a:lstStyle/>
           <a:p>
-            <a:fld id="{5B82BE30-0701-4B33-9FB7-97809ADFA210}" type="slidenum">
+            <a:fld id="{1E7AE30F-572E-4FBC-BA8C-F5F3D0B8DDE7}" type="slidenum">
               <a:rPr lang="en-US" smtClean="0"/>
               <a:t>‹#›</a:t>
             </a:fld>
@@ -810,7 +815,7 @@
     </p:spTree>
     <p:extLst>
       <p:ext uri="{BB962C8B-B14F-4D97-AF65-F5344CB8AC3E}">
-        <p14:creationId xmlns:p14="http://schemas.microsoft.com/office/powerpoint/2010/main" val="3210709342"/>
+        <p14:creationId xmlns:p14="http://schemas.microsoft.com/office/powerpoint/2010/main" val="1083169740"/>
       </p:ext>
     </p:extLst>
   </p:cSld>
@@ -1003,9 +1008,9 @@
           <a:bodyPr/>
           <a:lstStyle/>
           <a:p>
-            <a:fld id="{66B4ACDD-7230-4CA3-81A9-E784334FCE84}" type="datetimeFigureOut">
-              <a:rPr lang="en-US" smtClean="0"/>
-              <a:t>10/26/2015</a:t>
+            <a:fld id="{1F0E5C3F-7028-4B55-89E7-A5F6B3B3A01B}" type="datetimeFigureOut">
+              <a:rPr lang="en-US" smtClean="0"/>
+              <a:t>11/1/2015</a:t>
             </a:fld>
             <a:endParaRPr lang="en-US"/>
           </a:p>
@@ -1045,7 +1050,7 @@
           <a:bodyPr/>
           <a:lstStyle/>
           <a:p>
-            <a:fld id="{5B82BE30-0701-4B33-9FB7-97809ADFA210}" type="slidenum">
+            <a:fld id="{1E7AE30F-572E-4FBC-BA8C-F5F3D0B8DDE7}" type="slidenum">
               <a:rPr lang="en-US" smtClean="0"/>
               <a:t>‹#›</a:t>
             </a:fld>
@@ -1056,7 +1061,7 @@
     </p:spTree>
     <p:extLst>
       <p:ext uri="{BB962C8B-B14F-4D97-AF65-F5344CB8AC3E}">
-        <p14:creationId xmlns:p14="http://schemas.microsoft.com/office/powerpoint/2010/main" val="3504114802"/>
+        <p14:creationId xmlns:p14="http://schemas.microsoft.com/office/powerpoint/2010/main" val="238245012"/>
       </p:ext>
     </p:extLst>
   </p:cSld>
@@ -1235,9 +1240,9 @@
           <a:bodyPr/>
           <a:lstStyle/>
           <a:p>
-            <a:fld id="{66B4ACDD-7230-4CA3-81A9-E784334FCE84}" type="datetimeFigureOut">
-              <a:rPr lang="en-US" smtClean="0"/>
-              <a:t>10/26/2015</a:t>
+            <a:fld id="{1F0E5C3F-7028-4B55-89E7-A5F6B3B3A01B}" type="datetimeFigureOut">
+              <a:rPr lang="en-US" smtClean="0"/>
+              <a:t>11/1/2015</a:t>
             </a:fld>
             <a:endParaRPr lang="en-US"/>
           </a:p>
@@ -1277,7 +1282,7 @@
           <a:bodyPr/>
           <a:lstStyle/>
           <a:p>
-            <a:fld id="{5B82BE30-0701-4B33-9FB7-97809ADFA210}" type="slidenum">
+            <a:fld id="{1E7AE30F-572E-4FBC-BA8C-F5F3D0B8DDE7}" type="slidenum">
               <a:rPr lang="en-US" smtClean="0"/>
               <a:t>‹#›</a:t>
             </a:fld>
@@ -1288,7 +1293,7 @@
     </p:spTree>
     <p:extLst>
       <p:ext uri="{BB962C8B-B14F-4D97-AF65-F5344CB8AC3E}">
-        <p14:creationId xmlns:p14="http://schemas.microsoft.com/office/powerpoint/2010/main" val="3911480148"/>
+        <p14:creationId xmlns:p14="http://schemas.microsoft.com/office/powerpoint/2010/main" val="1422490074"/>
       </p:ext>
     </p:extLst>
   </p:cSld>
@@ -1602,9 +1607,9 @@
           <a:bodyPr/>
           <a:lstStyle/>
           <a:p>
-            <a:fld id="{66B4ACDD-7230-4CA3-81A9-E784334FCE84}" type="datetimeFigureOut">
-              <a:rPr lang="en-US" smtClean="0"/>
-              <a:t>10/26/2015</a:t>
+            <a:fld id="{1F0E5C3F-7028-4B55-89E7-A5F6B3B3A01B}" type="datetimeFigureOut">
+              <a:rPr lang="en-US" smtClean="0"/>
+              <a:t>11/1/2015</a:t>
             </a:fld>
             <a:endParaRPr lang="en-US"/>
           </a:p>
@@ -1644,7 +1649,7 @@
           <a:bodyPr/>
           <a:lstStyle/>
           <a:p>
-            <a:fld id="{5B82BE30-0701-4B33-9FB7-97809ADFA210}" type="slidenum">
+            <a:fld id="{1E7AE30F-572E-4FBC-BA8C-F5F3D0B8DDE7}" type="slidenum">
               <a:rPr lang="en-US" smtClean="0"/>
               <a:t>‹#›</a:t>
             </a:fld>
@@ -1655,7 +1660,7 @@
     </p:spTree>
     <p:extLst>
       <p:ext uri="{BB962C8B-B14F-4D97-AF65-F5344CB8AC3E}">
-        <p14:creationId xmlns:p14="http://schemas.microsoft.com/office/powerpoint/2010/main" val="3045093073"/>
+        <p14:creationId xmlns:p14="http://schemas.microsoft.com/office/powerpoint/2010/main" val="4059356440"/>
       </p:ext>
     </p:extLst>
   </p:cSld>
@@ -1720,9 +1725,9 @@
           <a:bodyPr/>
           <a:lstStyle/>
           <a:p>
-            <a:fld id="{66B4ACDD-7230-4CA3-81A9-E784334FCE84}" type="datetimeFigureOut">
-              <a:rPr lang="en-US" smtClean="0"/>
-              <a:t>10/26/2015</a:t>
+            <a:fld id="{1F0E5C3F-7028-4B55-89E7-A5F6B3B3A01B}" type="datetimeFigureOut">
+              <a:rPr lang="en-US" smtClean="0"/>
+              <a:t>11/1/2015</a:t>
             </a:fld>
             <a:endParaRPr lang="en-US"/>
           </a:p>
@@ -1762,7 +1767,7 @@
           <a:bodyPr/>
           <a:lstStyle/>
           <a:p>
-            <a:fld id="{5B82BE30-0701-4B33-9FB7-97809ADFA210}" type="slidenum">
+            <a:fld id="{1E7AE30F-572E-4FBC-BA8C-F5F3D0B8DDE7}" type="slidenum">
               <a:rPr lang="en-US" smtClean="0"/>
               <a:t>‹#›</a:t>
             </a:fld>
@@ -1773,7 +1778,7 @@
     </p:spTree>
     <p:extLst>
       <p:ext uri="{BB962C8B-B14F-4D97-AF65-F5344CB8AC3E}">
-        <p14:creationId xmlns:p14="http://schemas.microsoft.com/office/powerpoint/2010/main" val="3741297950"/>
+        <p14:creationId xmlns:p14="http://schemas.microsoft.com/office/powerpoint/2010/main" val="2747046407"/>
       </p:ext>
     </p:extLst>
   </p:cSld>
@@ -1815,9 +1820,9 @@
           <a:bodyPr/>
           <a:lstStyle/>
           <a:p>
-            <a:fld id="{66B4ACDD-7230-4CA3-81A9-E784334FCE84}" type="datetimeFigureOut">
-              <a:rPr lang="en-US" smtClean="0"/>
-              <a:t>10/26/2015</a:t>
+            <a:fld id="{1F0E5C3F-7028-4B55-89E7-A5F6B3B3A01B}" type="datetimeFigureOut">
+              <a:rPr lang="en-US" smtClean="0"/>
+              <a:t>11/1/2015</a:t>
             </a:fld>
             <a:endParaRPr lang="en-US"/>
           </a:p>
@@ -1857,7 +1862,7 @@
           <a:bodyPr/>
           <a:lstStyle/>
           <a:p>
-            <a:fld id="{5B82BE30-0701-4B33-9FB7-97809ADFA210}" type="slidenum">
+            <a:fld id="{1E7AE30F-572E-4FBC-BA8C-F5F3D0B8DDE7}" type="slidenum">
               <a:rPr lang="en-US" smtClean="0"/>
               <a:t>‹#›</a:t>
             </a:fld>
@@ -1868,7 +1873,7 @@
     </p:spTree>
     <p:extLst>
       <p:ext uri="{BB962C8B-B14F-4D97-AF65-F5344CB8AC3E}">
-        <p14:creationId xmlns:p14="http://schemas.microsoft.com/office/powerpoint/2010/main" val="1347844315"/>
+        <p14:creationId xmlns:p14="http://schemas.microsoft.com/office/powerpoint/2010/main" val="1347626803"/>
       </p:ext>
     </p:extLst>
   </p:cSld>
@@ -2092,9 +2097,9 @@
           <a:bodyPr/>
           <a:lstStyle/>
           <a:p>
-            <a:fld id="{66B4ACDD-7230-4CA3-81A9-E784334FCE84}" type="datetimeFigureOut">
-              <a:rPr lang="en-US" smtClean="0"/>
-              <a:t>10/26/2015</a:t>
+            <a:fld id="{1F0E5C3F-7028-4B55-89E7-A5F6B3B3A01B}" type="datetimeFigureOut">
+              <a:rPr lang="en-US" smtClean="0"/>
+              <a:t>11/1/2015</a:t>
             </a:fld>
             <a:endParaRPr lang="en-US"/>
           </a:p>
@@ -2134,7 +2139,7 @@
           <a:bodyPr/>
           <a:lstStyle/>
           <a:p>
-            <a:fld id="{5B82BE30-0701-4B33-9FB7-97809ADFA210}" type="slidenum">
+            <a:fld id="{1E7AE30F-572E-4FBC-BA8C-F5F3D0B8DDE7}" type="slidenum">
               <a:rPr lang="en-US" smtClean="0"/>
               <a:t>‹#›</a:t>
             </a:fld>
@@ -2145,7 +2150,7 @@
     </p:spTree>
     <p:extLst>
       <p:ext uri="{BB962C8B-B14F-4D97-AF65-F5344CB8AC3E}">
-        <p14:creationId xmlns:p14="http://schemas.microsoft.com/office/powerpoint/2010/main" val="4097982978"/>
+        <p14:creationId xmlns:p14="http://schemas.microsoft.com/office/powerpoint/2010/main" val="581076966"/>
       </p:ext>
     </p:extLst>
   </p:cSld>
@@ -2345,9 +2350,9 @@
           <a:bodyPr/>
           <a:lstStyle/>
           <a:p>
-            <a:fld id="{66B4ACDD-7230-4CA3-81A9-E784334FCE84}" type="datetimeFigureOut">
-              <a:rPr lang="en-US" smtClean="0"/>
-              <a:t>10/26/2015</a:t>
+            <a:fld id="{1F0E5C3F-7028-4B55-89E7-A5F6B3B3A01B}" type="datetimeFigureOut">
+              <a:rPr lang="en-US" smtClean="0"/>
+              <a:t>11/1/2015</a:t>
             </a:fld>
             <a:endParaRPr lang="en-US"/>
           </a:p>
@@ -2387,7 +2392,7 @@
           <a:bodyPr/>
           <a:lstStyle/>
           <a:p>
-            <a:fld id="{5B82BE30-0701-4B33-9FB7-97809ADFA210}" type="slidenum">
+            <a:fld id="{1E7AE30F-572E-4FBC-BA8C-F5F3D0B8DDE7}" type="slidenum">
               <a:rPr lang="en-US" smtClean="0"/>
               <a:t>‹#›</a:t>
             </a:fld>
@@ -2398,7 +2403,7 @@
     </p:spTree>
     <p:extLst>
       <p:ext uri="{BB962C8B-B14F-4D97-AF65-F5344CB8AC3E}">
-        <p14:creationId xmlns:p14="http://schemas.microsoft.com/office/powerpoint/2010/main" val="2429215425"/>
+        <p14:creationId xmlns:p14="http://schemas.microsoft.com/office/powerpoint/2010/main" val="1788137967"/>
       </p:ext>
     </p:extLst>
   </p:cSld>
@@ -2409,7 +2414,7 @@
 </file>
 
 <file path=ppt/slideMasters/slideMaster1.xml><?xml version="1.0" encoding="utf-8"?>
-<p:sldMaster xmlns:a="http://schemas.openxmlformats.org/drawingml/2006/main" xmlns:r="http://schemas.openxmlformats.org/officeDocument/2006/relationships" xmlns:p="http://schemas.openxmlformats.org/presentationml/2006/main">
+<p:sldMaster xmlns:a="http://schemas.openxmlformats.org/drawingml/2006/main" xmlns:r="http://schemas.openxmlformats.org/officeDocument/2006/relationships" xmlns:p="http://schemas.openxmlformats.org/presentationml/2006/main" preserve="1">
   <p:cSld>
     <p:bg>
       <p:bgRef idx="1001">
@@ -2558,9 +2563,9 @@
             </a:lvl1pPr>
           </a:lstStyle>
           <a:p>
-            <a:fld id="{66B4ACDD-7230-4CA3-81A9-E784334FCE84}" type="datetimeFigureOut">
-              <a:rPr lang="en-US" smtClean="0"/>
-              <a:t>10/26/2015</a:t>
+            <a:fld id="{1F0E5C3F-7028-4B55-89E7-A5F6B3B3A01B}" type="datetimeFigureOut">
+              <a:rPr lang="en-US" smtClean="0"/>
+              <a:t>11/1/2015</a:t>
             </a:fld>
             <a:endParaRPr lang="en-US"/>
           </a:p>
@@ -2636,7 +2641,7 @@
             </a:lvl1pPr>
           </a:lstStyle>
           <a:p>
-            <a:fld id="{5B82BE30-0701-4B33-9FB7-97809ADFA210}" type="slidenum">
+            <a:fld id="{1E7AE30F-572E-4FBC-BA8C-F5F3D0B8DDE7}" type="slidenum">
               <a:rPr lang="en-US" smtClean="0"/>
               <a:t>‹#›</a:t>
             </a:fld>
@@ -2644,26 +2649,90 @@
           </a:p>
         </p:txBody>
       </p:sp>
+      <p:pic>
+        <p:nvPicPr>
+          <p:cNvPr id="2050" name="Picture 2"/>
+          <p:cNvPicPr>
+            <a:picLocks noChangeAspect="1" noChangeArrowheads="1"/>
+          </p:cNvPicPr>
+          <p:nvPr userDrawn="1"/>
+        </p:nvPicPr>
+        <p:blipFill>
+          <a:blip r:embed="rId13">
+            <a:extLst>
+              <a:ext uri="{28A0092B-C50C-407E-A947-70E740481C1C}">
+                <a14:useLocalDpi xmlns:a14="http://schemas.microsoft.com/office/drawing/2010/main" val="0"/>
+              </a:ext>
+            </a:extLst>
+          </a:blip>
+          <a:srcRect/>
+          <a:stretch>
+            <a:fillRect/>
+          </a:stretch>
+        </p:blipFill>
+        <p:spPr bwMode="auto">
+          <a:xfrm>
+            <a:off x="0" y="12700"/>
+            <a:ext cx="3505200" cy="381777"/>
+          </a:xfrm>
+          <a:prstGeom prst="rect">
+            <a:avLst/>
+          </a:prstGeom>
+          <a:noFill/>
+          <a:ln>
+            <a:noFill/>
+          </a:ln>
+          <a:effectLst/>
+          <a:extLst>
+            <a:ext uri="{909E8E84-426E-40DD-AFC4-6F175D3DCCD1}">
+              <a14:hiddenFill xmlns:a14="http://schemas.microsoft.com/office/drawing/2010/main">
+                <a:solidFill>
+                  <a:schemeClr val="accent1"/>
+                </a:solidFill>
+              </a14:hiddenFill>
+            </a:ext>
+            <a:ext uri="{91240B29-F687-4F45-9708-019B960494DF}">
+              <a14:hiddenLine xmlns:a14="http://schemas.microsoft.com/office/drawing/2010/main" w="9525">
+                <a:solidFill>
+                  <a:schemeClr val="tx1"/>
+                </a:solidFill>
+                <a:miter lim="800000"/>
+                <a:headEnd/>
+                <a:tailEnd/>
+              </a14:hiddenLine>
+            </a:ext>
+            <a:ext uri="{AF507438-7753-43E0-B8FC-AC1667EBCBE1}">
+              <a14:hiddenEffects xmlns:a14="http://schemas.microsoft.com/office/drawing/2010/main">
+                <a:effectLst>
+                  <a:outerShdw dist="35921" dir="2700000" algn="ctr" rotWithShape="0">
+                    <a:schemeClr val="bg2"/>
+                  </a:outerShdw>
+                </a:effectLst>
+              </a14:hiddenEffects>
+            </a:ext>
+          </a:extLst>
+        </p:spPr>
+      </p:pic>
     </p:spTree>
     <p:extLst>
       <p:ext uri="{BB962C8B-B14F-4D97-AF65-F5344CB8AC3E}">
-        <p14:creationId xmlns:p14="http://schemas.microsoft.com/office/powerpoint/2010/main" val="2435071951"/>
+        <p14:creationId xmlns:p14="http://schemas.microsoft.com/office/powerpoint/2010/main" val="2753518592"/>
       </p:ext>
     </p:extLst>
   </p:cSld>
   <p:clrMap bg1="lt1" tx1="dk1" bg2="lt2" tx2="dk2" accent1="accent1" accent2="accent2" accent3="accent3" accent4="accent4" accent5="accent5" accent6="accent6" hlink="hlink" folHlink="folHlink"/>
   <p:sldLayoutIdLst>
-    <p:sldLayoutId id="2147483649" r:id="rId1"/>
-    <p:sldLayoutId id="2147483650" r:id="rId2"/>
-    <p:sldLayoutId id="2147483651" r:id="rId3"/>
-    <p:sldLayoutId id="2147483652" r:id="rId4"/>
-    <p:sldLayoutId id="2147483653" r:id="rId5"/>
-    <p:sldLayoutId id="2147483654" r:id="rId6"/>
-    <p:sldLayoutId id="2147483655" r:id="rId7"/>
-    <p:sldLayoutId id="2147483656" r:id="rId8"/>
-    <p:sldLayoutId id="2147483657" r:id="rId9"/>
-    <p:sldLayoutId id="2147483658" r:id="rId10"/>
-    <p:sldLayoutId id="2147483659" r:id="rId11"/>
+    <p:sldLayoutId id="2147483661" r:id="rId1"/>
+    <p:sldLayoutId id="2147483662" r:id="rId2"/>
+    <p:sldLayoutId id="2147483663" r:id="rId3"/>
+    <p:sldLayoutId id="2147483664" r:id="rId4"/>
+    <p:sldLayoutId id="2147483665" r:id="rId5"/>
+    <p:sldLayoutId id="2147483666" r:id="rId6"/>
+    <p:sldLayoutId id="2147483667" r:id="rId7"/>
+    <p:sldLayoutId id="2147483668" r:id="rId8"/>
+    <p:sldLayoutId id="2147483669" r:id="rId9"/>
+    <p:sldLayoutId id="2147483670" r:id="rId10"/>
+    <p:sldLayoutId id="2147483671" r:id="rId11"/>
   </p:sldLayoutIdLst>
   <p:txStyles>
     <p:titleStyle>
@@ -2972,16 +3041,16 @@
             <a:spLocks noGrp="1"/>
           </p:cNvSpPr>
           <p:nvPr>
-            <p:ph type="ctrTitle"/>
-          </p:nvPr>
-        </p:nvSpPr>
-        <p:spPr/>
-        <p:txBody>
-          <a:bodyPr/>
-          <a:lstStyle/>
-          <a:p>
-            <a:r>
-              <a:rPr lang="en-US" dirty="0" smtClean="0"/>
+            <p:ph type="title"/>
+          </p:nvPr>
+        </p:nvSpPr>
+        <p:spPr/>
+        <p:txBody>
+          <a:bodyPr/>
+          <a:lstStyle/>
+          <a:p>
+            <a:r>
+              <a:rPr lang="en-US" smtClean="0"/>
               <a:t>Breakout Sessions</a:t>
             </a:r>
             <a:endParaRPr lang="en-US" dirty="0"/>
@@ -2995,51 +3064,115 @@
             <a:spLocks noGrp="1"/>
           </p:cNvSpPr>
           <p:nvPr>
-            <p:ph type="subTitle" idx="1"/>
+            <p:ph idx="1"/>
           </p:nvPr>
         </p:nvSpPr>
         <p:spPr/>
         <p:txBody>
           <a:bodyPr>
-            <a:normAutofit fontScale="55000" lnSpcReduction="20000"/>
+            <a:normAutofit fontScale="85000" lnSpcReduction="20000"/>
           </a:bodyPr>
           <a:lstStyle/>
           <a:p>
-            <a:r>
-              <a:rPr lang="en-US" dirty="0" smtClean="0"/>
-              <a:t>Two 40 minute breakout sessions </a:t>
-            </a:r>
-          </a:p>
-          <a:p>
-            <a:r>
-              <a:rPr lang="en-US" dirty="0" smtClean="0"/>
+            <a:pPr marL="342900" indent="-342900" algn="l">
+              <a:buFont typeface="Arial" panose="020B0604020202020204" pitchFamily="34" charset="0"/>
+              <a:buChar char="•"/>
+            </a:pPr>
+            <a:r>
+              <a:rPr lang="en-US" smtClean="0"/>
+              <a:t>One 80 minute breakout session</a:t>
+            </a:r>
+          </a:p>
+          <a:p>
+            <a:pPr marL="342900" indent="-342900" algn="l">
+              <a:buFont typeface="Arial" panose="020B0604020202020204" pitchFamily="34" charset="0"/>
+              <a:buChar char="•"/>
+            </a:pPr>
+            <a:r>
+              <a:rPr lang="en-US" smtClean="0"/>
               <a:t>Break into groups – maybe 10 people each, could depend on table arrangements in room</a:t>
             </a:r>
           </a:p>
           <a:p>
-            <a:r>
-              <a:rPr lang="en-US" dirty="0" smtClean="0"/>
-              <a:t>New groups for each session</a:t>
-            </a:r>
-          </a:p>
-          <a:p>
-            <a:r>
-              <a:rPr lang="en-US" dirty="0" smtClean="0"/>
-              <a:t>Each group assigned a different topic (or two) to discuss</a:t>
-            </a:r>
-          </a:p>
-          <a:p>
-            <a:r>
-              <a:rPr lang="en-US" dirty="0" smtClean="0"/>
-              <a:t>A METS Board member should be in each group</a:t>
-            </a:r>
-          </a:p>
-          <a:p>
-            <a:r>
-              <a:rPr lang="en-US" dirty="0" smtClean="0"/>
-              <a:t>Breakout groups report back to the larger group at the end (or after each session?)</a:t>
-            </a:r>
-            <a:endParaRPr lang="en-US" dirty="0"/>
+            <a:pPr marL="342900" indent="-342900" algn="l">
+              <a:buFont typeface="Arial" panose="020B0604020202020204" pitchFamily="34" charset="0"/>
+              <a:buChar char="•"/>
+            </a:pPr>
+            <a:r>
+              <a:rPr lang="en-US" smtClean="0"/>
+              <a:t>All groups will be given the same list of possible topics to discuss</a:t>
+            </a:r>
+          </a:p>
+          <a:p>
+            <a:pPr marL="800100" lvl="1" indent="-342900" algn="l">
+              <a:buFont typeface="Arial" panose="020B0604020202020204" pitchFamily="34" charset="0"/>
+              <a:buChar char="•"/>
+            </a:pPr>
+            <a:r>
+              <a:rPr lang="en-US" smtClean="0"/>
+              <a:t>Some topics may emerge from presentations or questions earlier in the day</a:t>
+            </a:r>
+          </a:p>
+          <a:p>
+            <a:pPr marL="342900" indent="-342900" algn="l">
+              <a:buFont typeface="Arial" panose="020B0604020202020204" pitchFamily="34" charset="0"/>
+              <a:buChar char="•"/>
+            </a:pPr>
+            <a:r>
+              <a:rPr lang="en-US" smtClean="0"/>
+              <a:t>Each group can choose which topics to discuss and how much time to devote to each topic</a:t>
+            </a:r>
+          </a:p>
+          <a:p>
+            <a:pPr marL="342900" indent="-342900" algn="l">
+              <a:buFont typeface="Arial" panose="020B0604020202020204" pitchFamily="34" charset="0"/>
+              <a:buChar char="•"/>
+            </a:pPr>
+            <a:r>
+              <a:rPr lang="en-US" smtClean="0"/>
+              <a:t>A METS Board member should be in each group acting as the discussion leader</a:t>
+            </a:r>
+          </a:p>
+          <a:p>
+            <a:pPr marL="342900" indent="-342900" algn="l">
+              <a:buFont typeface="Arial" panose="020B0604020202020204" pitchFamily="34" charset="0"/>
+              <a:buChar char="•"/>
+            </a:pPr>
+            <a:r>
+              <a:rPr lang="en-US" smtClean="0"/>
+              <a:t>Each group should also select a note taker or reporter</a:t>
+            </a:r>
+          </a:p>
+          <a:p>
+            <a:pPr marL="342900" indent="-342900" algn="l">
+              <a:buFont typeface="Arial" panose="020B0604020202020204" pitchFamily="34" charset="0"/>
+              <a:buChar char="•"/>
+            </a:pPr>
+            <a:r>
+              <a:rPr lang="en-US" smtClean="0"/>
+              <a:t>Breakout groups report back to the larger group at the end.</a:t>
+            </a:r>
+          </a:p>
+          <a:p>
+            <a:pPr marL="342900" indent="-342900" algn="l">
+              <a:buFont typeface="Arial" panose="020B0604020202020204" pitchFamily="34" charset="0"/>
+              <a:buChar char="•"/>
+            </a:pPr>
+            <a:r>
+              <a:rPr lang="en-US" smtClean="0"/>
+              <a:t>Notes should be collected by the METS Board at the end.</a:t>
+            </a:r>
+          </a:p>
+          <a:p>
+            <a:pPr marL="800100" lvl="1" indent="-342900" algn="l">
+              <a:buFont typeface="Arial" panose="020B0604020202020204" pitchFamily="34" charset="0"/>
+              <a:buChar char="•"/>
+            </a:pPr>
+            <a:r>
+              <a:rPr lang="en-US" smtClean="0"/>
+              <a:t>They will be summarized and provided back to participants at a later date</a:t>
+            </a:r>
+            <a:endParaRPr lang="en-US" dirty="0" smtClean="0"/>
           </a:p>
         </p:txBody>
       </p:sp>
@@ -3109,7 +3242,7 @@
         <p:spPr/>
         <p:txBody>
           <a:bodyPr>
-            <a:normAutofit fontScale="92500" lnSpcReduction="20000"/>
+            <a:normAutofit fontScale="70000" lnSpcReduction="20000"/>
           </a:bodyPr>
           <a:lstStyle/>
           <a:p>
@@ -3122,13 +3255,21 @@
             <a:pPr lvl="1"/>
             <a:r>
               <a:rPr lang="en-US" dirty="0" smtClean="0"/>
-              <a:t>Are there other possible useful alignments?</a:t>
-            </a:r>
-          </a:p>
-          <a:p>
+              <a:t>Are there other possible useful alignments</a:t>
+            </a:r>
             <a:r>
               <a:rPr lang="en-US" dirty="0" smtClean="0"/>
-              <a:t>Does METS 2 need both a </a:t>
+              <a:t>?</a:t>
+            </a:r>
+          </a:p>
+          <a:p>
+            <a:r>
+              <a:rPr lang="en-US" dirty="0" smtClean="0"/>
+              <a:t>Does </a:t>
+            </a:r>
+            <a:r>
+              <a:rPr lang="en-US" dirty="0" smtClean="0"/>
+              <a:t>METS 2 need both a </a:t>
             </a:r>
             <a:r>
               <a:rPr lang="en-US" dirty="0" err="1" smtClean="0"/>
@@ -3166,7 +3307,15 @@
             <a:pPr lvl="1"/>
             <a:r>
               <a:rPr lang="en-US" dirty="0" smtClean="0"/>
-              <a:t>What is use cases for </a:t>
+              <a:t>What </a:t>
+            </a:r>
+            <a:r>
+              <a:rPr lang="en-US" dirty="0" smtClean="0"/>
+              <a:t>are use </a:t>
+            </a:r>
+            <a:r>
+              <a:rPr lang="en-US" dirty="0" smtClean="0"/>
+              <a:t>cases for </a:t>
             </a:r>
             <a:r>
               <a:rPr lang="en-US" dirty="0" err="1" smtClean="0"/>
@@ -3180,8 +3329,31 @@
           <a:p>
             <a:r>
               <a:rPr lang="en-US" dirty="0" smtClean="0"/>
-              <a:t>Do you agree that METS should utilize PREMIS for technical and provenance metadata (maybe rights too)?</a:t>
-            </a:r>
+              <a:t>Do you agree that METS should utilize PREMIS for technical and provenance metadata (maybe rights too</a:t>
+            </a:r>
+            <a:r>
+              <a:rPr lang="en-US" dirty="0" smtClean="0"/>
+              <a:t>)?</a:t>
+            </a:r>
+          </a:p>
+          <a:p>
+            <a:pPr lvl="1"/>
+            <a:r>
+              <a:rPr lang="en-US" dirty="0" smtClean="0"/>
+              <a:t>How important is metadata about metadata, such as the provenance of technical metadata, for example?</a:t>
+            </a:r>
+            <a:endParaRPr lang="en-US" dirty="0" smtClean="0"/>
+          </a:p>
+          <a:p>
+            <a:r>
+              <a:rPr lang="en-US" dirty="0"/>
+              <a:t>Should METS use classes from other schema directly, or should METS create its own subclasses of these</a:t>
+            </a:r>
+            <a:r>
+              <a:rPr lang="en-US" dirty="0" smtClean="0"/>
+              <a:t>?</a:t>
+            </a:r>
+            <a:endParaRPr lang="en-US" dirty="0" smtClean="0"/>
           </a:p>
           <a:p>
             <a:r>
@@ -3193,11 +3365,7 @@
             <a:pPr lvl="1"/>
             <a:r>
               <a:rPr lang="en-US" dirty="0" smtClean="0"/>
-              <a:t>Could </a:t>
-            </a:r>
-            <a:r>
-              <a:rPr lang="en-US" dirty="0" smtClean="0"/>
-              <a:t>intellectual entity be used to model collections? </a:t>
+              <a:t>Could intellectual entity be used to model collections? </a:t>
             </a:r>
           </a:p>
           <a:p>
@@ -3206,7 +3374,6 @@
               <a:rPr lang="en-US" dirty="0" smtClean="0"/>
               <a:t>Other use cases?</a:t>
             </a:r>
-            <a:endParaRPr lang="en-US" dirty="0" smtClean="0"/>
           </a:p>
           <a:p>
             <a:r>
@@ -3237,7 +3404,7 @@
 </file>
 
 <file path=ppt/theme/theme1.xml><?xml version="1.0" encoding="utf-8"?>
-<a:theme xmlns:a="http://schemas.openxmlformats.org/drawingml/2006/main" name="Office Theme">
+<a:theme xmlns:a="http://schemas.openxmlformats.org/drawingml/2006/main" name="1_Office Theme">
   <a:themeElements>
     <a:clrScheme name="Office">
       <a:dk1>

</xml_diff>